<commit_message>
rectified error in slide
</commit_message>
<xml_diff>
--- a/SPRING 20/CSE 101/Course Materials/number_systems_and_ops_1.pptx
+++ b/SPRING 20/CSE 101/Course Materials/number_systems_and_ops_1.pptx
@@ -13622,8 +13622,8 @@
           </a:p>
         </p:txBody>
       </p:sp>
-      <mc:AlternateContent xmlns:mc="http://schemas.openxmlformats.org/markup-compatibility/2006" xmlns:a14="http://schemas.microsoft.com/office/drawing/2010/main">
-        <mc:Choice Requires="a14">
+      <mc:AlternateContent xmlns:mc="http://schemas.openxmlformats.org/markup-compatibility/2006">
+        <mc:Choice xmlns:a14="http://schemas.microsoft.com/office/drawing/2010/main" Requires="a14">
           <p:graphicFrame>
             <p:nvGraphicFramePr>
               <p:cNvPr id="6" name="Table 6">
@@ -13639,7 +13639,7 @@
               <p:nvPr>
                 <p:extLst>
                   <p:ext uri="{D42A27DB-BD31-4B8C-83A1-F6EECF244321}">
-                    <p14:modId xmlns:p14="http://schemas.microsoft.com/office/powerpoint/2010/main" val="815161389"/>
+                    <p14:modId xmlns:p14="http://schemas.microsoft.com/office/powerpoint/2010/main" val="1247199503"/>
                   </p:ext>
                 </p:extLst>
               </p:nvPr>
@@ -14480,10 +14480,10 @@
                                   </m:sSupPr>
                                   <m:e>
                                     <m:r>
-                                      <a:rPr lang="en-SG" b="0" i="1" smtClean="0">
+                                      <a:rPr lang="en-US" b="0" i="1" smtClean="0">
                                         <a:latin typeface="Cambria Math" panose="02040503050406030204" pitchFamily="18" charset="0"/>
                                       </a:rPr>
-                                      <m:t>10</m:t>
+                                      <m:t>2</m:t>
                                     </m:r>
                                   </m:e>
                                   <m:sup>
@@ -14562,10 +14562,10 @@
                                   </m:sSupPr>
                                   <m:e>
                                     <m:r>
-                                      <a:rPr lang="en-SG" b="0" i="1" smtClean="0">
+                                      <a:rPr lang="en-US" b="0" i="1" smtClean="0">
                                         <a:latin typeface="Cambria Math" panose="02040503050406030204" pitchFamily="18" charset="0"/>
                                       </a:rPr>
-                                      <m:t>10</m:t>
+                                      <m:t>2</m:t>
                                     </m:r>
                                   </m:e>
                                   <m:sup>
@@ -14644,10 +14644,10 @@
                                   </m:sSupPr>
                                   <m:e>
                                     <m:r>
-                                      <a:rPr lang="en-SG" b="0" i="1" smtClean="0">
+                                      <a:rPr lang="en-US" b="0" i="1" smtClean="0">
                                         <a:latin typeface="Cambria Math" panose="02040503050406030204" pitchFamily="18" charset="0"/>
                                       </a:rPr>
-                                      <m:t>10</m:t>
+                                      <m:t>2</m:t>
                                     </m:r>
                                   </m:e>
                                   <m:sup>
@@ -14726,10 +14726,10 @@
                                   </m:sSupPr>
                                   <m:e>
                                     <m:r>
-                                      <a:rPr lang="en-SG" b="0" i="1" smtClean="0">
+                                      <a:rPr lang="en-US" b="0" i="1" smtClean="0">
                                         <a:latin typeface="Cambria Math" panose="02040503050406030204" pitchFamily="18" charset="0"/>
                                       </a:rPr>
-                                      <m:t>10</m:t>
+                                      <m:t>2</m:t>
                                     </m:r>
                                   </m:e>
                                   <m:sup>
@@ -14808,10 +14808,10 @@
                                   </m:sSupPr>
                                   <m:e>
                                     <m:r>
-                                      <a:rPr lang="en-SG" b="0" i="1" smtClean="0">
+                                      <a:rPr lang="en-US" b="0" i="1" smtClean="0">
                                         <a:latin typeface="Cambria Math" panose="02040503050406030204" pitchFamily="18" charset="0"/>
                                       </a:rPr>
-                                      <m:t>10</m:t>
+                                      <m:t>2</m:t>
                                     </m:r>
                                   </m:e>
                                   <m:sup>
@@ -14890,10 +14890,10 @@
                                   </m:sSupPr>
                                   <m:e>
                                     <m:r>
-                                      <a:rPr lang="en-SG" b="0" i="1" smtClean="0">
+                                      <a:rPr lang="en-US" b="0" i="1" smtClean="0">
                                         <a:latin typeface="Cambria Math" panose="02040503050406030204" pitchFamily="18" charset="0"/>
                                       </a:rPr>
-                                      <m:t>10</m:t>
+                                      <m:t>2</m:t>
                                     </m:r>
                                   </m:e>
                                   <m:sup>
@@ -16936,7 +16936,7 @@
             </a:graphic>
           </p:graphicFrame>
         </mc:Choice>
-        <mc:Fallback xmlns="">
+        <mc:Fallback>
           <p:graphicFrame>
             <p:nvGraphicFramePr>
               <p:cNvPr id="6" name="Table 6">
@@ -16952,7 +16952,7 @@
               <p:nvPr>
                 <p:extLst>
                   <p:ext uri="{D42A27DB-BD31-4B8C-83A1-F6EECF244321}">
-                    <p14:modId xmlns:p14="http://schemas.microsoft.com/office/powerpoint/2010/main" val="815161389"/>
+                    <p14:modId xmlns:p14="http://schemas.microsoft.com/office/powerpoint/2010/main" val="1247199503"/>
                   </p:ext>
                 </p:extLst>
               </p:nvPr>
@@ -24768,8 +24768,8 @@
           </p:sp>
         </mc:Fallback>
       </mc:AlternateContent>
-      <mc:AlternateContent xmlns:mc="http://schemas.openxmlformats.org/markup-compatibility/2006">
-        <mc:Choice xmlns:a14="http://schemas.microsoft.com/office/drawing/2010/main" Requires="a14">
+      <mc:AlternateContent xmlns:mc="http://schemas.openxmlformats.org/markup-compatibility/2006" xmlns:a14="http://schemas.microsoft.com/office/drawing/2010/main">
+        <mc:Choice Requires="a14">
           <p:graphicFrame>
             <p:nvGraphicFramePr>
               <p:cNvPr id="5" name="Table 4">
@@ -26678,7 +26678,7 @@
             </a:graphic>
           </p:graphicFrame>
         </mc:Choice>
-        <mc:Fallback>
+        <mc:Fallback xmlns="">
           <p:graphicFrame>
             <p:nvGraphicFramePr>
               <p:cNvPr id="5" name="Table 4">

</xml_diff>